<commit_message>
add lecture project zip.
</commit_message>
<xml_diff>
--- a/Week 10/Week 10 Lecture.pptx
+++ b/Week 10/Week 10 Lecture.pptx
@@ -204,7 +204,7 @@
           <a:p>
             <a:fld id="{F52C6709-C511-4DE8-ABD6-DB2E81FC1149}" type="datetimeFigureOut">
               <a:rPr lang="en-US" smtClean="0"/>
-              <a:t>11/21/2019</a:t>
+              <a:t>11/22/2019</a:t>
             </a:fld>
             <a:endParaRPr lang="en-US"/>
           </a:p>
@@ -661,7 +661,7 @@
           <a:p>
             <a:fld id="{DF13BD6C-D04E-4337-8BF8-D34DDB9F4393}" type="datetimeFigureOut">
               <a:rPr lang="en-US" smtClean="0"/>
-              <a:t>11/21/2019</a:t>
+              <a:t>11/22/2019</a:t>
             </a:fld>
             <a:endParaRPr lang="en-US"/>
           </a:p>
@@ -804,7 +804,7 @@
           <a:p>
             <a:fld id="{DF13BD6C-D04E-4337-8BF8-D34DDB9F4393}" type="datetimeFigureOut">
               <a:rPr lang="en-US" smtClean="0"/>
-              <a:t>11/21/2019</a:t>
+              <a:t>11/22/2019</a:t>
             </a:fld>
             <a:endParaRPr lang="en-US"/>
           </a:p>
@@ -1008,7 +1008,7 @@
           <a:p>
             <a:fld id="{DF13BD6C-D04E-4337-8BF8-D34DDB9F4393}" type="datetimeFigureOut">
               <a:rPr lang="en-US" smtClean="0"/>
-              <a:t>11/21/2019</a:t>
+              <a:t>11/22/2019</a:t>
             </a:fld>
             <a:endParaRPr lang="en-US"/>
           </a:p>
@@ -1202,7 +1202,7 @@
           <a:p>
             <a:fld id="{DF13BD6C-D04E-4337-8BF8-D34DDB9F4393}" type="datetimeFigureOut">
               <a:rPr lang="en-US" smtClean="0"/>
-              <a:t>11/21/2019</a:t>
+              <a:t>11/22/2019</a:t>
             </a:fld>
             <a:endParaRPr lang="en-US"/>
           </a:p>
@@ -1472,7 +1472,7 @@
           <a:p>
             <a:fld id="{DF13BD6C-D04E-4337-8BF8-D34DDB9F4393}" type="datetimeFigureOut">
               <a:rPr lang="en-US" smtClean="0"/>
-              <a:t>11/21/2019</a:t>
+              <a:t>11/22/2019</a:t>
             </a:fld>
             <a:endParaRPr lang="en-US"/>
           </a:p>
@@ -1784,7 +1784,7 @@
           <a:p>
             <a:fld id="{DF13BD6C-D04E-4337-8BF8-D34DDB9F4393}" type="datetimeFigureOut">
               <a:rPr lang="en-US" smtClean="0"/>
-              <a:t>11/21/2019</a:t>
+              <a:t>11/22/2019</a:t>
             </a:fld>
             <a:endParaRPr lang="en-US"/>
           </a:p>
@@ -2235,7 +2235,7 @@
           <a:p>
             <a:fld id="{DF13BD6C-D04E-4337-8BF8-D34DDB9F4393}" type="datetimeFigureOut">
               <a:rPr lang="en-US" smtClean="0"/>
-              <a:t>11/21/2019</a:t>
+              <a:t>11/22/2019</a:t>
             </a:fld>
             <a:endParaRPr lang="en-US"/>
           </a:p>
@@ -2377,7 +2377,7 @@
           <a:p>
             <a:fld id="{DF13BD6C-D04E-4337-8BF8-D34DDB9F4393}" type="datetimeFigureOut">
               <a:rPr lang="en-US" smtClean="0"/>
-              <a:t>11/21/2019</a:t>
+              <a:t>11/22/2019</a:t>
             </a:fld>
             <a:endParaRPr lang="en-US"/>
           </a:p>
@@ -2496,7 +2496,7 @@
           <a:p>
             <a:fld id="{DF13BD6C-D04E-4337-8BF8-D34DDB9F4393}" type="datetimeFigureOut">
               <a:rPr lang="en-US" smtClean="0"/>
-              <a:t>11/21/2019</a:t>
+              <a:t>11/22/2019</a:t>
             </a:fld>
             <a:endParaRPr lang="en-US"/>
           </a:p>
@@ -2797,7 +2797,7 @@
           <a:p>
             <a:fld id="{DF13BD6C-D04E-4337-8BF8-D34DDB9F4393}" type="datetimeFigureOut">
               <a:rPr lang="en-US" smtClean="0"/>
-              <a:t>11/21/2019</a:t>
+              <a:t>11/22/2019</a:t>
             </a:fld>
             <a:endParaRPr lang="en-US"/>
           </a:p>
@@ -3074,7 +3074,7 @@
           <a:p>
             <a:fld id="{DF13BD6C-D04E-4337-8BF8-D34DDB9F4393}" type="datetimeFigureOut">
               <a:rPr lang="en-US" smtClean="0"/>
-              <a:t>11/21/2019</a:t>
+              <a:t>11/22/2019</a:t>
             </a:fld>
             <a:endParaRPr lang="en-US"/>
           </a:p>
@@ -3682,24 +3682,36 @@
         <p:spPr/>
         <p:txBody>
           <a:bodyPr>
-            <a:normAutofit fontScale="92500" lnSpcReduction="20000"/>
+            <a:normAutofit/>
           </a:bodyPr>
           <a:lstStyle/>
           <a:p>
             <a:r>
               <a:rPr lang="en-US" dirty="0" smtClean="0"/>
-              <a:t>Week 9 – Methods, Strings and Basics </a:t>
-            </a:r>
-            <a:r>
-              <a:rPr lang="en-US" smtClean="0"/>
-              <a:t>of ArrayList</a:t>
+              <a:t>Week </a:t>
+            </a:r>
+            <a:r>
+              <a:rPr lang="en-US" dirty="0" smtClean="0"/>
+              <a:t>10 </a:t>
+            </a:r>
+            <a:r>
+              <a:rPr lang="en-US" dirty="0" smtClean="0"/>
+              <a:t>– </a:t>
+            </a:r>
+            <a:r>
+              <a:rPr lang="en-US" dirty="0" smtClean="0"/>
+              <a:t>More </a:t>
+            </a:r>
+            <a:r>
+              <a:rPr lang="en-US" smtClean="0"/>
+              <a:t>ArrayList</a:t>
             </a:r>
             <a:endParaRPr lang="en-US" dirty="0" smtClean="0"/>
           </a:p>
           <a:p>
             <a:r>
               <a:rPr lang="en-US" dirty="0" smtClean="0"/>
-              <a:t>2019-11-15</a:t>
+              <a:t>2019-11-22</a:t>
             </a:r>
             <a:endParaRPr lang="en-US" dirty="0"/>
           </a:p>
@@ -3759,11 +3771,7 @@
           <a:p>
             <a:r>
               <a:rPr lang="en-US" sz="3600" dirty="0" smtClean="0"/>
-              <a:t>Quick Exercise – </a:t>
-            </a:r>
-            <a:r>
-              <a:rPr lang="en-US" sz="3600" dirty="0" smtClean="0"/>
-              <a:t>More </a:t>
+              <a:t>Quick Exercise – More </a:t>
             </a:r>
             <a:r>
               <a:rPr lang="en-US" sz="3600" dirty="0" err="1" smtClean="0"/>
@@ -3812,11 +3820,7 @@
             </a:r>
             <a:r>
               <a:rPr lang="en-US" sz="4000" dirty="0" smtClean="0"/>
-              <a:t> </a:t>
-            </a:r>
-            <a:r>
-              <a:rPr lang="en-US" sz="4000" dirty="0" smtClean="0"/>
-              <a:t>that </a:t>
+              <a:t> that </a:t>
             </a:r>
             <a:r>
               <a:rPr lang="en-US" sz="4000" b="1" dirty="0" smtClean="0"/>
@@ -3866,7 +3870,6 @@
               <a:rPr lang="en-US" sz="4000" dirty="0" smtClean="0"/>
               <a:t>.</a:t>
             </a:r>
-            <a:endParaRPr lang="en-US" sz="4000" dirty="0" smtClean="0"/>
           </a:p>
         </p:txBody>
       </p:sp>
@@ -4104,7 +4107,6 @@
               <a:rPr lang="en-US" dirty="0" smtClean="0"/>
               <a:t>(4)) to remove the item with a value of 4</a:t>
             </a:r>
-            <a:endParaRPr lang="en-US" dirty="0" smtClean="0"/>
           </a:p>
         </p:txBody>
       </p:sp>
@@ -4398,7 +4400,6 @@
               <a:rPr lang="en-US" dirty="0" smtClean="0"/>
               <a:t> and you’re good to go</a:t>
             </a:r>
-            <a:endParaRPr lang="en-US" dirty="0" smtClean="0"/>
           </a:p>
         </p:txBody>
       </p:sp>
@@ -5429,7 +5430,6 @@
               <a:rPr lang="en-US" dirty="0" smtClean="0"/>
               <a:t>for-each loops</a:t>
             </a:r>
-            <a:endParaRPr lang="en-US" dirty="0" smtClean="0"/>
           </a:p>
         </p:txBody>
       </p:sp>
@@ -5773,7 +5773,6 @@
               <a:rPr lang="en-US" dirty="0" smtClean="0"/>
               <a:t>and we cannot access things we don’t immediately define</a:t>
             </a:r>
-            <a:endParaRPr lang="en-US" dirty="0" smtClean="0"/>
           </a:p>
         </p:txBody>
       </p:sp>
@@ -6023,7 +6022,6 @@
               <a:rPr lang="en-US" b="1" dirty="0" smtClean="0"/>
               <a:t>coders hate writing code</a:t>
             </a:r>
-            <a:endParaRPr lang="en-US" b="1" dirty="0" smtClean="0"/>
           </a:p>
         </p:txBody>
       </p:sp>
@@ -6258,7 +6256,6 @@
               <a:rPr lang="en-US" dirty="0" smtClean="0"/>
               <a:t>It’s efficient and very simple</a:t>
             </a:r>
-            <a:endParaRPr lang="en-US" dirty="0" smtClean="0"/>
           </a:p>
         </p:txBody>
       </p:sp>
@@ -6437,11 +6434,7 @@
           <a:p>
             <a:r>
               <a:rPr lang="en-US" dirty="0" smtClean="0"/>
-              <a:t>Quick Exercise – </a:t>
-            </a:r>
-            <a:r>
-              <a:rPr lang="en-US" dirty="0" smtClean="0"/>
-              <a:t>for-each loop</a:t>
+              <a:t>Quick Exercise – for-each loop</a:t>
             </a:r>
             <a:endParaRPr lang="en-US" dirty="0"/>
           </a:p>
@@ -6494,11 +6487,7 @@
             </a:r>
             <a:r>
               <a:rPr lang="en-US" sz="4000" dirty="0" smtClean="0"/>
-              <a:t>in it</a:t>
-            </a:r>
-            <a:r>
-              <a:rPr lang="en-US" sz="4000" dirty="0" smtClean="0"/>
-              <a:t>. Use a </a:t>
+              <a:t>in it. Use a </a:t>
             </a:r>
             <a:r>
               <a:rPr lang="en-US" sz="4000" b="1" dirty="0" smtClean="0"/>
@@ -6516,7 +6505,6 @@
               <a:rPr lang="en-US" sz="4000" dirty="0" smtClean="0"/>
               <a:t> all the names to the console.</a:t>
             </a:r>
-            <a:endParaRPr lang="en-US" sz="4000" dirty="0" smtClean="0"/>
           </a:p>
         </p:txBody>
       </p:sp>
@@ -7052,31 +7040,7 @@
             <a:pPr lvl="1"/>
             <a:r>
               <a:rPr lang="en-US" dirty="0"/>
-              <a:t>public</a:t>
-            </a:r>
-            <a:r>
-              <a:rPr lang="en-US" dirty="0"/>
-              <a:t> </a:t>
-            </a:r>
-            <a:r>
-              <a:rPr lang="en-US" dirty="0"/>
-              <a:t>static</a:t>
-            </a:r>
-            <a:r>
-              <a:rPr lang="en-US" dirty="0"/>
-              <a:t> </a:t>
-            </a:r>
-            <a:r>
-              <a:rPr lang="en-US" dirty="0"/>
-              <a:t>void</a:t>
-            </a:r>
-            <a:r>
-              <a:rPr lang="en-US" dirty="0"/>
-              <a:t> </a:t>
-            </a:r>
-            <a:r>
-              <a:rPr lang="en-US" dirty="0"/>
-              <a:t>print(</a:t>
+              <a:t>public static void print(</a:t>
             </a:r>
             <a:r>
               <a:rPr lang="en-US" i="1" dirty="0" err="1"/>
@@ -7088,25 +7052,16 @@
             </a:r>
             <a:r>
               <a:rPr lang="en-US" b="1" i="1" dirty="0"/>
-              <a:t>&gt;</a:t>
-            </a:r>
-            <a:r>
-              <a:rPr lang="en-US" b="1" i="1" dirty="0"/>
-              <a:t> list</a:t>
+              <a:t>&gt; list</a:t>
             </a:r>
             <a:r>
               <a:rPr lang="en-US" dirty="0"/>
-              <a:t>)</a:t>
-            </a:r>
-            <a:r>
-              <a:rPr lang="en-US" dirty="0"/>
-              <a:t> </a:t>
+              <a:t>) </a:t>
             </a:r>
             <a:r>
               <a:rPr lang="en-US" dirty="0" smtClean="0"/>
               <a:t>{}</a:t>
             </a:r>
-            <a:endParaRPr lang="en-US" dirty="0" smtClean="0"/>
           </a:p>
           <a:p>
             <a:pPr lvl="1"/>

</xml_diff>